<commit_message>
Fixes on Simpson Paradox for Unit 2b
</commit_message>
<xml_diff>
--- a/unit2/Unit2b - Eigenschaften von Wahrscheinlichkeitsraeumen.pptx
+++ b/unit2/Unit2b - Eigenschaften von Wahrscheinlichkeitsraeumen.pptx
@@ -360,7 +360,7 @@
             <a:fld id="{AA592FF2-A4BD-4E98-AC76-A10007E04C10}" type="datetimeFigureOut">
               <a:rPr lang="en-US" smtClean="0"/>
               <a:pPr/>
-              <a:t>10/19/24</a:t>
+              <a:t>10/24/24</a:t>
             </a:fld>
             <a:endParaRPr lang="en-US" dirty="0"/>
           </a:p>
@@ -1217,7 +1217,7 @@
             <a:fld id="{AA592FF2-A4BD-4E98-AC76-A10007E04C10}" type="datetimeFigureOut">
               <a:rPr lang="en-US" smtClean="0"/>
               <a:pPr/>
-              <a:t>10/19/24</a:t>
+              <a:t>10/24/24</a:t>
             </a:fld>
             <a:endParaRPr lang="en-US" dirty="0"/>
           </a:p>
@@ -10472,8 +10472,8 @@
           </a:fontRef>
         </p:style>
       </p:cxnSp>
-      <mc:AlternateContent xmlns:mc="http://schemas.openxmlformats.org/markup-compatibility/2006" xmlns:a14="http://schemas.microsoft.com/office/drawing/2010/main">
-        <mc:Choice Requires="a14">
+      <mc:AlternateContent xmlns:mc="http://schemas.openxmlformats.org/markup-compatibility/2006">
+        <mc:Choice xmlns:a14="http://schemas.microsoft.com/office/drawing/2010/main" Requires="a14">
           <p:sp>
             <p:nvSpPr>
               <p:cNvPr id="15" name="TextBox 14">
@@ -10607,7 +10607,25 @@
                           </a:solidFill>
                           <a:latin typeface="Cambria Math" panose="02040503050406030204" pitchFamily="18" charset="0"/>
                         </a:rPr>
-                        <m:t>=10%</m:t>
+                        <m:t>=</m:t>
+                      </m:r>
+                      <m:r>
+                        <a:rPr lang="en-US" sz="1050" i="1">
+                          <a:solidFill>
+                            <a:srgbClr val="C00000"/>
+                          </a:solidFill>
+                          <a:latin typeface="Cambria Math" panose="02040503050406030204" pitchFamily="18" charset="0"/>
+                        </a:rPr>
+                        <m:t>9</m:t>
+                      </m:r>
+                      <m:r>
+                        <a:rPr lang="en-US" sz="1050" b="0" i="1" smtClean="0">
+                          <a:solidFill>
+                            <a:srgbClr val="C00000"/>
+                          </a:solidFill>
+                          <a:latin typeface="Cambria Math" panose="02040503050406030204" pitchFamily="18" charset="0"/>
+                        </a:rPr>
+                        <m:t>0%</m:t>
                       </m:r>
                     </m:oMath>
                   </m:oMathPara>
@@ -10727,13 +10745,22 @@
                         <m:t>=</m:t>
                       </m:r>
                       <m:r>
+                        <a:rPr lang="en-US" sz="1050" i="1">
+                          <a:solidFill>
+                            <a:srgbClr val="C00000"/>
+                          </a:solidFill>
+                          <a:latin typeface="Cambria Math" panose="02040503050406030204" pitchFamily="18" charset="0"/>
+                        </a:rPr>
+                        <m:t>1</m:t>
+                      </m:r>
+                      <m:r>
                         <a:rPr lang="en-US" sz="1050" b="0" i="1" smtClean="0">
                           <a:solidFill>
                             <a:srgbClr val="C00000"/>
                           </a:solidFill>
                           <a:latin typeface="Cambria Math" panose="02040503050406030204" pitchFamily="18" charset="0"/>
                         </a:rPr>
-                        <m:t>90</m:t>
+                        <m:t>0</m:t>
                       </m:r>
                       <m:r>
                         <a:rPr lang="en-US" sz="1050" i="1">
@@ -10756,7 +10783,7 @@
             </p:txBody>
           </p:sp>
         </mc:Choice>
-        <mc:Fallback xmlns="">
+        <mc:Fallback>
           <p:sp>
             <p:nvSpPr>
               <p:cNvPr id="15" name="TextBox 14">
@@ -10791,7 +10818,7 @@
               <a:lstStyle/>
               <a:p>
                 <a:r>
-                  <a:rPr lang="en-DE">
+                  <a:rPr lang="de-DE">
                     <a:noFill/>
                   </a:rPr>
                   <a:t> </a:t>

</xml_diff>